<commit_message>
fix minor mistakes in recit-3 slides
</commit_message>
<xml_diff>
--- a/Recitation 3/CS306-Recitation3.pptx
+++ b/Recitation 3/CS306-Recitation3.pptx
@@ -275,7 +275,7 @@
           <a:p>
             <a:fld id="{C9652ED4-219D-4188-8213-E8E247AC1CC2}" type="datetimeFigureOut">
               <a:rPr lang="en-US" smtClean="0"/>
-              <a:t>11-Mar-23</a:t>
+              <a:t>3/11/2023</a:t>
             </a:fld>
             <a:endParaRPr lang="en-US"/>
           </a:p>
@@ -473,7 +473,7 @@
           <a:p>
             <a:fld id="{C9652ED4-219D-4188-8213-E8E247AC1CC2}" type="datetimeFigureOut">
               <a:rPr lang="en-US" smtClean="0"/>
-              <a:t>11-Mar-23</a:t>
+              <a:t>3/11/2023</a:t>
             </a:fld>
             <a:endParaRPr lang="en-US"/>
           </a:p>
@@ -681,7 +681,7 @@
           <a:p>
             <a:fld id="{C9652ED4-219D-4188-8213-E8E247AC1CC2}" type="datetimeFigureOut">
               <a:rPr lang="en-US" smtClean="0"/>
-              <a:t>11-Mar-23</a:t>
+              <a:t>3/11/2023</a:t>
             </a:fld>
             <a:endParaRPr lang="en-US"/>
           </a:p>
@@ -879,7 +879,7 @@
           <a:p>
             <a:fld id="{C9652ED4-219D-4188-8213-E8E247AC1CC2}" type="datetimeFigureOut">
               <a:rPr lang="en-US" smtClean="0"/>
-              <a:t>11-Mar-23</a:t>
+              <a:t>3/11/2023</a:t>
             </a:fld>
             <a:endParaRPr lang="en-US"/>
           </a:p>
@@ -1154,7 +1154,7 @@
           <a:p>
             <a:fld id="{C9652ED4-219D-4188-8213-E8E247AC1CC2}" type="datetimeFigureOut">
               <a:rPr lang="en-US" smtClean="0"/>
-              <a:t>11-Mar-23</a:t>
+              <a:t>3/11/2023</a:t>
             </a:fld>
             <a:endParaRPr lang="en-US"/>
           </a:p>
@@ -1419,7 +1419,7 @@
           <a:p>
             <a:fld id="{C9652ED4-219D-4188-8213-E8E247AC1CC2}" type="datetimeFigureOut">
               <a:rPr lang="en-US" smtClean="0"/>
-              <a:t>11-Mar-23</a:t>
+              <a:t>3/11/2023</a:t>
             </a:fld>
             <a:endParaRPr lang="en-US"/>
           </a:p>
@@ -1831,7 +1831,7 @@
           <a:p>
             <a:fld id="{C9652ED4-219D-4188-8213-E8E247AC1CC2}" type="datetimeFigureOut">
               <a:rPr lang="en-US" smtClean="0"/>
-              <a:t>11-Mar-23</a:t>
+              <a:t>3/11/2023</a:t>
             </a:fld>
             <a:endParaRPr lang="en-US"/>
           </a:p>
@@ -1972,7 +1972,7 @@
           <a:p>
             <a:fld id="{C9652ED4-219D-4188-8213-E8E247AC1CC2}" type="datetimeFigureOut">
               <a:rPr lang="en-US" smtClean="0"/>
-              <a:t>11-Mar-23</a:t>
+              <a:t>3/11/2023</a:t>
             </a:fld>
             <a:endParaRPr lang="en-US"/>
           </a:p>
@@ -2085,7 +2085,7 @@
           <a:p>
             <a:fld id="{C9652ED4-219D-4188-8213-E8E247AC1CC2}" type="datetimeFigureOut">
               <a:rPr lang="en-US" smtClean="0"/>
-              <a:t>11-Mar-23</a:t>
+              <a:t>3/11/2023</a:t>
             </a:fld>
             <a:endParaRPr lang="en-US"/>
           </a:p>
@@ -2396,7 +2396,7 @@
           <a:p>
             <a:fld id="{C9652ED4-219D-4188-8213-E8E247AC1CC2}" type="datetimeFigureOut">
               <a:rPr lang="en-US" smtClean="0"/>
-              <a:t>11-Mar-23</a:t>
+              <a:t>3/11/2023</a:t>
             </a:fld>
             <a:endParaRPr lang="en-US"/>
           </a:p>
@@ -2684,7 +2684,7 @@
           <a:p>
             <a:fld id="{C9652ED4-219D-4188-8213-E8E247AC1CC2}" type="datetimeFigureOut">
               <a:rPr lang="en-US" smtClean="0"/>
-              <a:t>11-Mar-23</a:t>
+              <a:t>3/11/2023</a:t>
             </a:fld>
             <a:endParaRPr lang="en-US"/>
           </a:p>
@@ -2925,7 +2925,7 @@
           <a:p>
             <a:fld id="{C9652ED4-219D-4188-8213-E8E247AC1CC2}" type="datetimeFigureOut">
               <a:rPr lang="en-US" smtClean="0"/>
-              <a:t>11-Mar-23</a:t>
+              <a:t>3/11/2023</a:t>
             </a:fld>
             <a:endParaRPr lang="en-US"/>
           </a:p>
@@ -4030,7 +4030,7 @@
         </p:spPr>
         <p:txBody>
           <a:bodyPr vert="horz" lIns="91440" tIns="45720" rIns="91440" bIns="45720" rtlCol="0">
-            <a:normAutofit/>
+            <a:normAutofit fontScale="92500" lnSpcReduction="20000"/>
           </a:bodyPr>
           <a:lstStyle>
             <a:lvl1pPr marL="228600" indent="-228600" algn="l" defTabSz="914400" rtl="0" eaLnBrk="1" latinLnBrk="0" hangingPunct="1">
@@ -4238,6 +4238,20 @@
             </a:pPr>
             <a:r>
               <a:rPr lang="en-US" sz="1600" dirty="0" err="1"/>
+              <a:t>ssn</a:t>
+            </a:r>
+            <a:r>
+              <a:rPr lang="en-US" sz="1600" dirty="0"/>
+              <a:t> CHAR(11),</a:t>
+            </a:r>
+          </a:p>
+          <a:p>
+            <a:pPr marL="0" indent="0">
+              <a:buFont typeface="Arial" panose="020B0604020202020204" pitchFamily="34" charset="0"/>
+              <a:buNone/>
+            </a:pPr>
+            <a:r>
+              <a:rPr lang="en-US" sz="1600" dirty="0" err="1"/>
               <a:t>dname</a:t>
             </a:r>
             <a:r>
@@ -4272,7 +4286,33 @@
             </a:pPr>
             <a:r>
               <a:rPr lang="en-US" sz="1600" dirty="0"/>
-              <a:t>PRIMARY KEY (did)</a:t>
+              <a:t>PRIMARY KEY (did),</a:t>
+            </a:r>
+          </a:p>
+          <a:p>
+            <a:pPr marL="0" indent="0">
+              <a:buFont typeface="Arial" panose="020B0604020202020204" pitchFamily="34" charset="0"/>
+              <a:buNone/>
+            </a:pPr>
+            <a:r>
+              <a:rPr lang="en-US" sz="1600" dirty="0"/>
+              <a:t>FOREIGN KEY </a:t>
+            </a:r>
+            <a:r>
+              <a:rPr lang="en-US" sz="1600" dirty="0" err="1"/>
+              <a:t>ssn</a:t>
+            </a:r>
+            <a:r>
+              <a:rPr lang="en-US" sz="1600" dirty="0"/>
+              <a:t> REFERENCES Employees(</a:t>
+            </a:r>
+            <a:r>
+              <a:rPr lang="en-US" sz="1600" dirty="0" err="1"/>
+              <a:t>ssn</a:t>
+            </a:r>
+            <a:r>
+              <a:rPr lang="en-US" sz="1600" dirty="0"/>
+              <a:t>)</a:t>
             </a:r>
           </a:p>
           <a:p>
@@ -6360,8 +6400,8 @@
         </p:nvSpPr>
         <p:spPr>
           <a:xfrm>
-            <a:off x="7852195" y="3429000"/>
-            <a:ext cx="4221436" cy="2862322"/>
+            <a:off x="7835103" y="3711445"/>
+            <a:ext cx="4221436" cy="2308324"/>
           </a:xfrm>
           <a:prstGeom prst="rect">
             <a:avLst/>
@@ -6419,7 +6459,7 @@
             </a:r>
             <a:r>
               <a:rPr lang="en-US" sz="1600" dirty="0"/>
-              <a:t> CHAR(11),</a:t>
+              <a:t> CHAR(11) NOT NULL,</a:t>
             </a:r>
           </a:p>
           <a:p>
@@ -6463,15 +6503,7 @@
             </a:pPr>
             <a:r>
               <a:rPr lang="en-US" sz="1600" dirty="0"/>
-              <a:t>PRIMARY KEY (</a:t>
-            </a:r>
-            <a:r>
-              <a:rPr lang="en-US" sz="1600" dirty="0" err="1"/>
-              <a:t>did,ssn</a:t>
-            </a:r>
-            <a:r>
-              <a:rPr lang="en-US" sz="1600" dirty="0"/>
-              <a:t>),</a:t>
+              <a:t>PRIMARY KEY (did),</a:t>
             </a:r>
           </a:p>
           <a:p>
@@ -6496,29 +6528,10 @@
               <a:t>ssn</a:t>
             </a:r>
             <a:r>
-              <a:rPr lang="en-US" sz="1600" dirty="0"/>
-              <a:t>)</a:t>
-            </a:r>
-          </a:p>
-          <a:p>
-            <a:pPr marL="0" indent="0">
-              <a:buFont typeface="Arial" panose="020B0604020202020204" pitchFamily="34" charset="0"/>
-              <a:buNone/>
-            </a:pPr>
-            <a:r>
-              <a:rPr lang="en-US" sz="1600" dirty="0"/>
-              <a:t>ON DELETE CASCADE</a:t>
-            </a:r>
-          </a:p>
-          <a:p>
-            <a:pPr marL="0" indent="0">
-              <a:buFont typeface="Arial" panose="020B0604020202020204" pitchFamily="34" charset="0"/>
-              <a:buNone/>
-            </a:pPr>
-            <a:r>
-              <a:rPr lang="en-US" sz="1600" dirty="0"/>
-              <a:t>);</a:t>
-            </a:r>
+              <a:rPr lang="en-US" sz="1600"/>
+              <a:t>));</a:t>
+            </a:r>
+            <a:endParaRPr lang="en-US" sz="1600" dirty="0"/>
           </a:p>
         </p:txBody>
       </p:sp>
@@ -7838,7 +7851,7 @@
         </p:nvSpPr>
         <p:spPr>
           <a:xfrm>
-            <a:off x="934101" y="515517"/>
+            <a:off x="566632" y="515517"/>
             <a:ext cx="2711092" cy="1754326"/>
           </a:xfrm>
           <a:prstGeom prst="rect">
@@ -7915,7 +7928,233 @@
         </p:nvSpPr>
         <p:spPr>
           <a:xfrm>
-            <a:off x="8831244" y="515517"/>
+            <a:off x="8831242" y="247319"/>
+            <a:ext cx="3807987" cy="3693319"/>
+          </a:xfrm>
+          <a:prstGeom prst="rect">
+            <a:avLst/>
+          </a:prstGeom>
+          <a:noFill/>
+        </p:spPr>
+        <p:txBody>
+          <a:bodyPr wrap="square" rtlCol="0">
+            <a:spAutoFit/>
+          </a:bodyPr>
+          <a:lstStyle/>
+          <a:p>
+            <a:r>
+              <a:rPr lang="en-US" dirty="0"/>
+              <a:t>CREATE TABLE Monitors(</a:t>
+            </a:r>
+          </a:p>
+          <a:p>
+            <a:r>
+              <a:rPr lang="en-US" dirty="0" err="1"/>
+              <a:t>ssn</a:t>
+            </a:r>
+            <a:r>
+              <a:rPr lang="en-US" dirty="0"/>
+              <a:t> CHAR(11),</a:t>
+            </a:r>
+          </a:p>
+          <a:p>
+            <a:r>
+              <a:rPr lang="en-US" dirty="0" err="1"/>
+              <a:t>pid</a:t>
+            </a:r>
+            <a:r>
+              <a:rPr lang="en-US" dirty="0"/>
+              <a:t> CHAR(11),</a:t>
+            </a:r>
+          </a:p>
+          <a:p>
+            <a:r>
+              <a:rPr lang="en-US" dirty="0"/>
+              <a:t>did CHAR(11),</a:t>
+            </a:r>
+          </a:p>
+          <a:p>
+            <a:r>
+              <a:rPr lang="en-US" dirty="0"/>
+              <a:t>until DATE,</a:t>
+            </a:r>
+          </a:p>
+          <a:p>
+            <a:r>
+              <a:rPr lang="en-US" dirty="0"/>
+              <a:t>PRIMARY KEY (</a:t>
+            </a:r>
+            <a:r>
+              <a:rPr lang="en-US" dirty="0" err="1"/>
+              <a:t>ssn,pid,did</a:t>
+            </a:r>
+            <a:r>
+              <a:rPr lang="en-US" dirty="0"/>
+              <a:t>)</a:t>
+            </a:r>
+          </a:p>
+          <a:p>
+            <a:r>
+              <a:rPr lang="en-US" dirty="0"/>
+              <a:t>FOREIGN KEY </a:t>
+            </a:r>
+            <a:r>
+              <a:rPr lang="en-US" dirty="0" err="1"/>
+              <a:t>ssn</a:t>
+            </a:r>
+            <a:r>
+              <a:rPr lang="en-US" dirty="0"/>
+              <a:t> REFERENCES Employees,</a:t>
+            </a:r>
+          </a:p>
+          <a:p>
+            <a:r>
+              <a:rPr lang="en-US" dirty="0"/>
+              <a:t>FOREIGN KEY </a:t>
+            </a:r>
+            <a:r>
+              <a:rPr lang="en-US" dirty="0" err="1"/>
+              <a:t>pid</a:t>
+            </a:r>
+            <a:r>
+              <a:rPr lang="en-US" dirty="0"/>
+              <a:t> REFERENCES Projects,</a:t>
+            </a:r>
+          </a:p>
+          <a:p>
+            <a:r>
+              <a:rPr lang="en-US" dirty="0"/>
+              <a:t>FOREIGN KEY did REFERENCES Departments </a:t>
+            </a:r>
+          </a:p>
+          <a:p>
+            <a:r>
+              <a:rPr lang="en-US" dirty="0"/>
+              <a:t>)</a:t>
+            </a:r>
+          </a:p>
+        </p:txBody>
+      </p:sp>
+      <p:sp>
+        <p:nvSpPr>
+          <p:cNvPr id="4" name="TextBox 3">
+            <a:extLst>
+              <a:ext uri="{FF2B5EF4-FFF2-40B4-BE49-F238E27FC236}">
+                <a16:creationId xmlns:a16="http://schemas.microsoft.com/office/drawing/2014/main" id="{84239E9E-0E0B-D71D-62F0-56ADF6389EE5}"/>
+              </a:ext>
+            </a:extLst>
+          </p:cNvPr>
+          <p:cNvSpPr txBox="1"/>
+          <p:nvPr/>
+        </p:nvSpPr>
+        <p:spPr>
+          <a:xfrm>
+            <a:off x="3807363" y="3967652"/>
+            <a:ext cx="4558970" cy="2585323"/>
+          </a:xfrm>
+          <a:prstGeom prst="rect">
+            <a:avLst/>
+          </a:prstGeom>
+          <a:noFill/>
+        </p:spPr>
+        <p:txBody>
+          <a:bodyPr wrap="square" rtlCol="0">
+            <a:spAutoFit/>
+          </a:bodyPr>
+          <a:lstStyle/>
+          <a:p>
+            <a:r>
+              <a:rPr lang="en-US" dirty="0"/>
+              <a:t>CREATE TABLE Sponsors(</a:t>
+            </a:r>
+          </a:p>
+          <a:p>
+            <a:r>
+              <a:rPr lang="en-US" dirty="0" err="1"/>
+              <a:t>pid</a:t>
+            </a:r>
+            <a:r>
+              <a:rPr lang="en-US" dirty="0"/>
+              <a:t> CHAR(11),</a:t>
+            </a:r>
+          </a:p>
+          <a:p>
+            <a:r>
+              <a:rPr lang="en-US" dirty="0"/>
+              <a:t>did CHAR(11),</a:t>
+            </a:r>
+          </a:p>
+          <a:p>
+            <a:r>
+              <a:rPr lang="en-US" dirty="0"/>
+              <a:t>Since DATE,</a:t>
+            </a:r>
+          </a:p>
+          <a:p>
+            <a:r>
+              <a:rPr lang="en-US" dirty="0"/>
+              <a:t>PRIMARY KEY (</a:t>
+            </a:r>
+            <a:r>
+              <a:rPr lang="en-US" dirty="0" err="1"/>
+              <a:t>pid,did</a:t>
+            </a:r>
+            <a:r>
+              <a:rPr lang="en-US" dirty="0"/>
+              <a:t>),</a:t>
+            </a:r>
+          </a:p>
+          <a:p>
+            <a:r>
+              <a:rPr lang="en-US" dirty="0"/>
+              <a:t>FOREIGN KEY </a:t>
+            </a:r>
+            <a:r>
+              <a:rPr lang="en-US" dirty="0" err="1"/>
+              <a:t>pid</a:t>
+            </a:r>
+            <a:r>
+              <a:rPr lang="en-US" dirty="0"/>
+              <a:t> REFERENCES Projects(</a:t>
+            </a:r>
+            <a:r>
+              <a:rPr lang="en-US" dirty="0" err="1"/>
+              <a:t>pid</a:t>
+            </a:r>
+            <a:r>
+              <a:rPr lang="en-US" dirty="0"/>
+              <a:t>),</a:t>
+            </a:r>
+          </a:p>
+          <a:p>
+            <a:r>
+              <a:rPr lang="en-US" dirty="0"/>
+              <a:t>FOREIGN KEY (did) REFERENCES Departments(did)</a:t>
+            </a:r>
+          </a:p>
+          <a:p>
+            <a:r>
+              <a:rPr lang="en-US" dirty="0"/>
+              <a:t>)</a:t>
+            </a:r>
+          </a:p>
+        </p:txBody>
+      </p:sp>
+      <p:sp>
+        <p:nvSpPr>
+          <p:cNvPr id="6" name="TextBox 5">
+            <a:extLst>
+              <a:ext uri="{FF2B5EF4-FFF2-40B4-BE49-F238E27FC236}">
+                <a16:creationId xmlns:a16="http://schemas.microsoft.com/office/drawing/2014/main" id="{10401419-CE07-97A9-8CA5-1B580890D23B}"/>
+              </a:ext>
+            </a:extLst>
+          </p:cNvPr>
+          <p:cNvSpPr txBox="1"/>
+          <p:nvPr/>
+        </p:nvSpPr>
+        <p:spPr>
+          <a:xfrm>
+            <a:off x="566632" y="3939643"/>
             <a:ext cx="2711092" cy="1754326"/>
           </a:xfrm>
           <a:prstGeom prst="rect">
@@ -7931,17 +8170,7 @@
           <a:p>
             <a:r>
               <a:rPr lang="en-US" dirty="0"/>
-              <a:t>CREATE TABLE Monitors(</a:t>
-            </a:r>
-          </a:p>
-          <a:p>
-            <a:r>
-              <a:rPr lang="en-US" dirty="0" err="1"/>
-              <a:t>ssn</a:t>
-            </a:r>
-            <a:r>
-              <a:rPr lang="en-US" dirty="0"/>
-              <a:t> CHAR(11),</a:t>
+              <a:t>CREATE TABLE Projects(</a:t>
             </a:r>
           </a:p>
           <a:p>
@@ -7956,8 +8185,22 @@
           </a:p>
           <a:p>
             <a:r>
-              <a:rPr lang="en-US" dirty="0"/>
-              <a:t>did CHAR(11),</a:t>
+              <a:rPr lang="en-US" dirty="0" err="1"/>
+              <a:t>started_on</a:t>
+            </a:r>
+            <a:r>
+              <a:rPr lang="en-US" dirty="0"/>
+              <a:t> DATE,</a:t>
+            </a:r>
+          </a:p>
+          <a:p>
+            <a:r>
+              <a:rPr lang="en-US" dirty="0" err="1"/>
+              <a:t>Pbudget</a:t>
+            </a:r>
+            <a:r>
+              <a:rPr lang="en-US" dirty="0"/>
+              <a:t> DECIMAL,</a:t>
             </a:r>
           </a:p>
           <a:p>
@@ -7967,7 +8210,7 @@
             </a:r>
             <a:r>
               <a:rPr lang="en-US" dirty="0" err="1"/>
-              <a:t>ssn,pid,did</a:t>
+              <a:t>pid</a:t>
             </a:r>
             <a:r>
               <a:rPr lang="en-US" dirty="0"/>
@@ -7984,10 +8227,10 @@
       </p:sp>
       <p:sp>
         <p:nvSpPr>
-          <p:cNvPr id="4" name="TextBox 3">
-            <a:extLst>
-              <a:ext uri="{FF2B5EF4-FFF2-40B4-BE49-F238E27FC236}">
-                <a16:creationId xmlns:a16="http://schemas.microsoft.com/office/drawing/2014/main" id="{84239E9E-0E0B-D71D-62F0-56ADF6389EE5}"/>
+          <p:cNvPr id="7" name="TextBox 6">
+            <a:extLst>
+              <a:ext uri="{FF2B5EF4-FFF2-40B4-BE49-F238E27FC236}">
+                <a16:creationId xmlns:a16="http://schemas.microsoft.com/office/drawing/2014/main" id="{EC1AD271-D329-8205-B7F5-6DCB172CBEBE}"/>
               </a:ext>
             </a:extLst>
           </p:cNvPr>
@@ -7996,169 +8239,7 @@
         </p:nvSpPr>
         <p:spPr>
           <a:xfrm>
-            <a:off x="4449483" y="3967652"/>
-            <a:ext cx="3577471" cy="1754326"/>
-          </a:xfrm>
-          <a:prstGeom prst="rect">
-            <a:avLst/>
-          </a:prstGeom>
-          <a:noFill/>
-        </p:spPr>
-        <p:txBody>
-          <a:bodyPr wrap="square" rtlCol="0">
-            <a:spAutoFit/>
-          </a:bodyPr>
-          <a:lstStyle/>
-          <a:p>
-            <a:r>
-              <a:rPr lang="en-US" dirty="0"/>
-              <a:t>CREATE TABLE Sponsors(</a:t>
-            </a:r>
-          </a:p>
-          <a:p>
-            <a:r>
-              <a:rPr lang="en-US" dirty="0" err="1"/>
-              <a:t>pid</a:t>
-            </a:r>
-            <a:r>
-              <a:rPr lang="en-US" dirty="0"/>
-              <a:t> CHAR(11),</a:t>
-            </a:r>
-          </a:p>
-          <a:p>
-            <a:r>
-              <a:rPr lang="en-US" dirty="0"/>
-              <a:t>did CHAR(11),</a:t>
-            </a:r>
-          </a:p>
-          <a:p>
-            <a:r>
-              <a:rPr lang="en-US" dirty="0"/>
-              <a:t>Since DATE,</a:t>
-            </a:r>
-          </a:p>
-          <a:p>
-            <a:r>
-              <a:rPr lang="en-US" dirty="0"/>
-              <a:t>PRIMARY KEY (</a:t>
-            </a:r>
-            <a:r>
-              <a:rPr lang="en-US" dirty="0" err="1"/>
-              <a:t>pid,did</a:t>
-            </a:r>
-            <a:r>
-              <a:rPr lang="en-US" dirty="0"/>
-              <a:t>)</a:t>
-            </a:r>
-          </a:p>
-          <a:p>
-            <a:r>
-              <a:rPr lang="en-US" dirty="0"/>
-              <a:t>)</a:t>
-            </a:r>
-          </a:p>
-        </p:txBody>
-      </p:sp>
-      <p:sp>
-        <p:nvSpPr>
-          <p:cNvPr id="6" name="TextBox 5">
-            <a:extLst>
-              <a:ext uri="{FF2B5EF4-FFF2-40B4-BE49-F238E27FC236}">
-                <a16:creationId xmlns:a16="http://schemas.microsoft.com/office/drawing/2014/main" id="{10401419-CE07-97A9-8CA5-1B580890D23B}"/>
-              </a:ext>
-            </a:extLst>
-          </p:cNvPr>
-          <p:cNvSpPr txBox="1"/>
-          <p:nvPr/>
-        </p:nvSpPr>
-        <p:spPr>
-          <a:xfrm>
-            <a:off x="934101" y="3967652"/>
-            <a:ext cx="2711092" cy="1754326"/>
-          </a:xfrm>
-          <a:prstGeom prst="rect">
-            <a:avLst/>
-          </a:prstGeom>
-          <a:noFill/>
-        </p:spPr>
-        <p:txBody>
-          <a:bodyPr wrap="square" rtlCol="0">
-            <a:spAutoFit/>
-          </a:bodyPr>
-          <a:lstStyle/>
-          <a:p>
-            <a:r>
-              <a:rPr lang="en-US" dirty="0"/>
-              <a:t>CREATE TABLE Projects(</a:t>
-            </a:r>
-          </a:p>
-          <a:p>
-            <a:r>
-              <a:rPr lang="en-US" dirty="0" err="1"/>
-              <a:t>pid</a:t>
-            </a:r>
-            <a:r>
-              <a:rPr lang="en-US" dirty="0"/>
-              <a:t> CHAR(11),</a:t>
-            </a:r>
-          </a:p>
-          <a:p>
-            <a:r>
-              <a:rPr lang="en-US" dirty="0" err="1"/>
-              <a:t>started_on</a:t>
-            </a:r>
-            <a:r>
-              <a:rPr lang="en-US" dirty="0"/>
-              <a:t> DATE,</a:t>
-            </a:r>
-          </a:p>
-          <a:p>
-            <a:r>
-              <a:rPr lang="en-US" dirty="0" err="1"/>
-              <a:t>Pbudget</a:t>
-            </a:r>
-            <a:r>
-              <a:rPr lang="en-US" dirty="0"/>
-              <a:t> DECIMAL,</a:t>
-            </a:r>
-          </a:p>
-          <a:p>
-            <a:r>
-              <a:rPr lang="en-US" dirty="0"/>
-              <a:t>PRIMARY KEY (</a:t>
-            </a:r>
-            <a:r>
-              <a:rPr lang="en-US" dirty="0" err="1"/>
-              <a:t>pid</a:t>
-            </a:r>
-            <a:r>
-              <a:rPr lang="en-US" dirty="0"/>
-              <a:t>)</a:t>
-            </a:r>
-          </a:p>
-          <a:p>
-            <a:r>
-              <a:rPr lang="en-US" dirty="0"/>
-              <a:t>)</a:t>
-            </a:r>
-          </a:p>
-        </p:txBody>
-      </p:sp>
-      <p:sp>
-        <p:nvSpPr>
-          <p:cNvPr id="7" name="TextBox 6">
-            <a:extLst>
-              <a:ext uri="{FF2B5EF4-FFF2-40B4-BE49-F238E27FC236}">
-                <a16:creationId xmlns:a16="http://schemas.microsoft.com/office/drawing/2014/main" id="{EC1AD271-D329-8205-B7F5-6DCB172CBEBE}"/>
-              </a:ext>
-            </a:extLst>
-          </p:cNvPr>
-          <p:cNvSpPr txBox="1"/>
-          <p:nvPr/>
-        </p:nvSpPr>
-        <p:spPr>
-          <a:xfrm>
-            <a:off x="8831244" y="3967652"/>
+            <a:off x="8831242" y="4207825"/>
             <a:ext cx="3073016" cy="1754326"/>
           </a:xfrm>
           <a:prstGeom prst="rect">

</xml_diff>